<commit_message>
Created more figures. Broke leg.
Created more figures for the report. Leg broke during testing of ExtTest2_2.
</commit_message>
<xml_diff>
--- a/Documentation/Reports and Papers/Knee_Torque_Test/Figures/Figure components/ExtPin_group.pptx
+++ b/Documentation/Reports and Papers/Knee_Torque_Test/Figures/Figure components/ExtPin_group.pptx
@@ -2,12 +2,12 @@
 <file path=ppt/presentation.xml><?xml version="1.0" encoding="utf-8"?>
 <p:presentation xmlns:a="http://schemas.openxmlformats.org/drawingml/2006/main" xmlns:r="http://schemas.openxmlformats.org/officeDocument/2006/relationships" xmlns:p="http://schemas.openxmlformats.org/presentationml/2006/main" saveSubsetFonts="1" autoCompressPictures="0">
   <p:sldMasterIdLst>
-    <p:sldMasterId id="2147483684" r:id="rId1"/>
+    <p:sldMasterId id="2147483696" r:id="rId1"/>
   </p:sldMasterIdLst>
   <p:sldIdLst>
     <p:sldId id="256" r:id="rId2"/>
   </p:sldIdLst>
-  <p:sldSz cx="10333038" cy="6400800"/>
+  <p:sldSz cx="20666075" cy="12801600"/>
   <p:notesSz cx="6858000" cy="9144000"/>
   <p:defaultTextStyle>
     <a:defPPr>
@@ -104,6 +104,11 @@
       </a:defRPr>
     </a:lvl9pPr>
   </p:defaultTextStyle>
+  <p:extLst>
+    <p:ext uri="{EFAFB233-063F-42B5-8137-9DF3F51BA10A}">
+      <p15:sldGuideLst xmlns:p15="http://schemas.microsoft.com/office/powerpoint/2012/main"/>
+    </p:ext>
+  </p:extLst>
 </p:presentation>
 </file>
 
@@ -136,15 +141,15 @@
         </p:nvSpPr>
         <p:spPr>
           <a:xfrm>
-            <a:off x="1291630" y="1047539"/>
-            <a:ext cx="7749779" cy="2228427"/>
+            <a:off x="2583260" y="2095078"/>
+            <a:ext cx="15499556" cy="4456853"/>
           </a:xfrm>
         </p:spPr>
         <p:txBody>
           <a:bodyPr anchor="b"/>
           <a:lstStyle>
             <a:lvl1pPr algn="ctr">
-              <a:defRPr sz="5085"/>
+              <a:defRPr sz="10171"/>
             </a:lvl1pPr>
           </a:lstStyle>
           <a:p>
@@ -168,8 +173,8 @@
         </p:nvSpPr>
         <p:spPr>
           <a:xfrm>
-            <a:off x="1291630" y="3361902"/>
-            <a:ext cx="7749779" cy="1545378"/>
+            <a:off x="2583260" y="6723804"/>
+            <a:ext cx="15499556" cy="3090756"/>
           </a:xfrm>
         </p:spPr>
         <p:txBody>
@@ -177,39 +182,39 @@
           <a:lstStyle>
             <a:lvl1pPr marL="0" indent="0" algn="ctr">
               <a:buNone/>
-              <a:defRPr sz="2034"/>
+              <a:defRPr sz="4068"/>
             </a:lvl1pPr>
-            <a:lvl2pPr marL="387477" indent="0" algn="ctr">
-              <a:buNone/>
-              <a:defRPr sz="1695"/>
+            <a:lvl2pPr marL="775000" indent="0" algn="ctr">
+              <a:buNone/>
+              <a:defRPr sz="3390"/>
             </a:lvl2pPr>
-            <a:lvl3pPr marL="774954" indent="0" algn="ctr">
-              <a:buNone/>
-              <a:defRPr sz="1526"/>
+            <a:lvl3pPr marL="1549999" indent="0" algn="ctr">
+              <a:buNone/>
+              <a:defRPr sz="3051"/>
             </a:lvl3pPr>
-            <a:lvl4pPr marL="1162431" indent="0" algn="ctr">
-              <a:buNone/>
-              <a:defRPr sz="1356"/>
+            <a:lvl4pPr marL="2324999" indent="0" algn="ctr">
+              <a:buNone/>
+              <a:defRPr sz="2712"/>
             </a:lvl4pPr>
-            <a:lvl5pPr marL="1549908" indent="0" algn="ctr">
-              <a:buNone/>
-              <a:defRPr sz="1356"/>
+            <a:lvl5pPr marL="3099999" indent="0" algn="ctr">
+              <a:buNone/>
+              <a:defRPr sz="2712"/>
             </a:lvl5pPr>
-            <a:lvl6pPr marL="1937385" indent="0" algn="ctr">
-              <a:buNone/>
-              <a:defRPr sz="1356"/>
+            <a:lvl6pPr marL="3874999" indent="0" algn="ctr">
+              <a:buNone/>
+              <a:defRPr sz="2712"/>
             </a:lvl6pPr>
-            <a:lvl7pPr marL="2324862" indent="0" algn="ctr">
-              <a:buNone/>
-              <a:defRPr sz="1356"/>
+            <a:lvl7pPr marL="4649998" indent="0" algn="ctr">
+              <a:buNone/>
+              <a:defRPr sz="2712"/>
             </a:lvl7pPr>
-            <a:lvl8pPr marL="2712339" indent="0" algn="ctr">
-              <a:buNone/>
-              <a:defRPr sz="1356"/>
+            <a:lvl8pPr marL="5424998" indent="0" algn="ctr">
+              <a:buNone/>
+              <a:defRPr sz="2712"/>
             </a:lvl8pPr>
-            <a:lvl9pPr marL="3099816" indent="0" algn="ctr">
-              <a:buNone/>
-              <a:defRPr sz="1356"/>
+            <a:lvl9pPr marL="6199998" indent="0" algn="ctr">
+              <a:buNone/>
+              <a:defRPr sz="2712"/>
             </a:lvl9pPr>
           </a:lstStyle>
           <a:p>
@@ -289,7 +294,7 @@
     </p:spTree>
     <p:extLst>
       <p:ext uri="{BB962C8B-B14F-4D97-AF65-F5344CB8AC3E}">
-        <p14:creationId xmlns:p14="http://schemas.microsoft.com/office/powerpoint/2010/main" val="4155014803"/>
+        <p14:creationId xmlns:p14="http://schemas.microsoft.com/office/powerpoint/2010/main" val="1218115564"/>
       </p:ext>
     </p:extLst>
   </p:cSld>
@@ -459,7 +464,7 @@
     </p:spTree>
     <p:extLst>
       <p:ext uri="{BB962C8B-B14F-4D97-AF65-F5344CB8AC3E}">
-        <p14:creationId xmlns:p14="http://schemas.microsoft.com/office/powerpoint/2010/main" val="393841307"/>
+        <p14:creationId xmlns:p14="http://schemas.microsoft.com/office/powerpoint/2010/main" val="81127287"/>
       </p:ext>
     </p:extLst>
   </p:cSld>
@@ -498,8 +503,8 @@
         </p:nvSpPr>
         <p:spPr>
           <a:xfrm>
-            <a:off x="7394580" y="340783"/>
-            <a:ext cx="2228061" cy="5424382"/>
+            <a:off x="14789160" y="681567"/>
+            <a:ext cx="4456122" cy="10848764"/>
           </a:xfrm>
         </p:spPr>
         <p:txBody>
@@ -526,8 +531,8 @@
         </p:nvSpPr>
         <p:spPr>
           <a:xfrm>
-            <a:off x="710396" y="340783"/>
-            <a:ext cx="6555021" cy="5424382"/>
+            <a:off x="1420793" y="681567"/>
+            <a:ext cx="13110041" cy="10848764"/>
           </a:xfrm>
         </p:spPr>
         <p:txBody>
@@ -639,7 +644,7 @@
     </p:spTree>
     <p:extLst>
       <p:ext uri="{BB962C8B-B14F-4D97-AF65-F5344CB8AC3E}">
-        <p14:creationId xmlns:p14="http://schemas.microsoft.com/office/powerpoint/2010/main" val="3554922045"/>
+        <p14:creationId xmlns:p14="http://schemas.microsoft.com/office/powerpoint/2010/main" val="1288967367"/>
       </p:ext>
     </p:extLst>
   </p:cSld>
@@ -809,7 +814,7 @@
     </p:spTree>
     <p:extLst>
       <p:ext uri="{BB962C8B-B14F-4D97-AF65-F5344CB8AC3E}">
-        <p14:creationId xmlns:p14="http://schemas.microsoft.com/office/powerpoint/2010/main" val="2972421684"/>
+        <p14:creationId xmlns:p14="http://schemas.microsoft.com/office/powerpoint/2010/main" val="73499858"/>
       </p:ext>
     </p:extLst>
   </p:cSld>
@@ -848,15 +853,15 @@
         </p:nvSpPr>
         <p:spPr>
           <a:xfrm>
-            <a:off x="705015" y="1595756"/>
-            <a:ext cx="8912245" cy="2662555"/>
+            <a:off x="1410029" y="3191512"/>
+            <a:ext cx="17824490" cy="5325109"/>
           </a:xfrm>
         </p:spPr>
         <p:txBody>
           <a:bodyPr anchor="b"/>
           <a:lstStyle>
             <a:lvl1pPr>
-              <a:defRPr sz="5085"/>
+              <a:defRPr sz="10171"/>
             </a:lvl1pPr>
           </a:lstStyle>
           <a:p>
@@ -880,8 +885,8 @@
         </p:nvSpPr>
         <p:spPr>
           <a:xfrm>
-            <a:off x="705015" y="4283499"/>
-            <a:ext cx="8912245" cy="1400175"/>
+            <a:off x="1410029" y="8566999"/>
+            <a:ext cx="17824490" cy="2800349"/>
           </a:xfrm>
         </p:spPr>
         <p:txBody>
@@ -889,7 +894,7 @@
           <a:lstStyle>
             <a:lvl1pPr marL="0" indent="0">
               <a:buNone/>
-              <a:defRPr sz="2034">
+              <a:defRPr sz="4068">
                 <a:solidFill>
                   <a:schemeClr val="tx1">
                     <a:tint val="75000"/>
@@ -897,9 +902,9 @@
                 </a:solidFill>
               </a:defRPr>
             </a:lvl1pPr>
-            <a:lvl2pPr marL="387477" indent="0">
-              <a:buNone/>
-              <a:defRPr sz="1695">
+            <a:lvl2pPr marL="775000" indent="0">
+              <a:buNone/>
+              <a:defRPr sz="3390">
                 <a:solidFill>
                   <a:schemeClr val="tx1">
                     <a:tint val="75000"/>
@@ -907,9 +912,9 @@
                 </a:solidFill>
               </a:defRPr>
             </a:lvl2pPr>
-            <a:lvl3pPr marL="774954" indent="0">
-              <a:buNone/>
-              <a:defRPr sz="1526">
+            <a:lvl3pPr marL="1549999" indent="0">
+              <a:buNone/>
+              <a:defRPr sz="3051">
                 <a:solidFill>
                   <a:schemeClr val="tx1">
                     <a:tint val="75000"/>
@@ -917,9 +922,9 @@
                 </a:solidFill>
               </a:defRPr>
             </a:lvl3pPr>
-            <a:lvl4pPr marL="1162431" indent="0">
-              <a:buNone/>
-              <a:defRPr sz="1356">
+            <a:lvl4pPr marL="2324999" indent="0">
+              <a:buNone/>
+              <a:defRPr sz="2712">
                 <a:solidFill>
                   <a:schemeClr val="tx1">
                     <a:tint val="75000"/>
@@ -927,9 +932,9 @@
                 </a:solidFill>
               </a:defRPr>
             </a:lvl4pPr>
-            <a:lvl5pPr marL="1549908" indent="0">
-              <a:buNone/>
-              <a:defRPr sz="1356">
+            <a:lvl5pPr marL="3099999" indent="0">
+              <a:buNone/>
+              <a:defRPr sz="2712">
                 <a:solidFill>
                   <a:schemeClr val="tx1">
                     <a:tint val="75000"/>
@@ -937,9 +942,9 @@
                 </a:solidFill>
               </a:defRPr>
             </a:lvl5pPr>
-            <a:lvl6pPr marL="1937385" indent="0">
-              <a:buNone/>
-              <a:defRPr sz="1356">
+            <a:lvl6pPr marL="3874999" indent="0">
+              <a:buNone/>
+              <a:defRPr sz="2712">
                 <a:solidFill>
                   <a:schemeClr val="tx1">
                     <a:tint val="75000"/>
@@ -947,9 +952,9 @@
                 </a:solidFill>
               </a:defRPr>
             </a:lvl6pPr>
-            <a:lvl7pPr marL="2324862" indent="0">
-              <a:buNone/>
-              <a:defRPr sz="1356">
+            <a:lvl7pPr marL="4649998" indent="0">
+              <a:buNone/>
+              <a:defRPr sz="2712">
                 <a:solidFill>
                   <a:schemeClr val="tx1">
                     <a:tint val="75000"/>
@@ -957,9 +962,9 @@
                 </a:solidFill>
               </a:defRPr>
             </a:lvl7pPr>
-            <a:lvl8pPr marL="2712339" indent="0">
-              <a:buNone/>
-              <a:defRPr sz="1356">
+            <a:lvl8pPr marL="5424998" indent="0">
+              <a:buNone/>
+              <a:defRPr sz="2712">
                 <a:solidFill>
                   <a:schemeClr val="tx1">
                     <a:tint val="75000"/>
@@ -967,9 +972,9 @@
                 </a:solidFill>
               </a:defRPr>
             </a:lvl8pPr>
-            <a:lvl9pPr marL="3099816" indent="0">
-              <a:buNone/>
-              <a:defRPr sz="1356">
+            <a:lvl9pPr marL="6199998" indent="0">
+              <a:buNone/>
+              <a:defRPr sz="2712">
                 <a:solidFill>
                   <a:schemeClr val="tx1">
                     <a:tint val="75000"/>
@@ -1055,7 +1060,7 @@
     </p:spTree>
     <p:extLst>
       <p:ext uri="{BB962C8B-B14F-4D97-AF65-F5344CB8AC3E}">
-        <p14:creationId xmlns:p14="http://schemas.microsoft.com/office/powerpoint/2010/main" val="1664034179"/>
+        <p14:creationId xmlns:p14="http://schemas.microsoft.com/office/powerpoint/2010/main" val="1945529727"/>
       </p:ext>
     </p:extLst>
   </p:cSld>
@@ -1117,8 +1122,8 @@
         </p:nvSpPr>
         <p:spPr>
           <a:xfrm>
-            <a:off x="710396" y="1703917"/>
-            <a:ext cx="4391541" cy="4061249"/>
+            <a:off x="1420793" y="3407833"/>
+            <a:ext cx="8783082" cy="8122498"/>
           </a:xfrm>
         </p:spPr>
         <p:txBody>
@@ -1174,8 +1179,8 @@
         </p:nvSpPr>
         <p:spPr>
           <a:xfrm>
-            <a:off x="5231101" y="1703917"/>
-            <a:ext cx="4391541" cy="4061249"/>
+            <a:off x="10462200" y="3407833"/>
+            <a:ext cx="8783082" cy="8122498"/>
           </a:xfrm>
         </p:spPr>
         <p:txBody>
@@ -1287,7 +1292,7 @@
     </p:spTree>
     <p:extLst>
       <p:ext uri="{BB962C8B-B14F-4D97-AF65-F5344CB8AC3E}">
-        <p14:creationId xmlns:p14="http://schemas.microsoft.com/office/powerpoint/2010/main" val="2736031323"/>
+        <p14:creationId xmlns:p14="http://schemas.microsoft.com/office/powerpoint/2010/main" val="2743951272"/>
       </p:ext>
     </p:extLst>
   </p:cSld>
@@ -1326,8 +1331,8 @@
         </p:nvSpPr>
         <p:spPr>
           <a:xfrm>
-            <a:off x="711742" y="340784"/>
-            <a:ext cx="8912245" cy="1237192"/>
+            <a:off x="1423484" y="681568"/>
+            <a:ext cx="17824490" cy="2474384"/>
           </a:xfrm>
         </p:spPr>
         <p:txBody>
@@ -1354,8 +1359,8 @@
         </p:nvSpPr>
         <p:spPr>
           <a:xfrm>
-            <a:off x="711743" y="1569085"/>
-            <a:ext cx="4371359" cy="768985"/>
+            <a:off x="1423485" y="3138171"/>
+            <a:ext cx="8742718" cy="1537969"/>
           </a:xfrm>
         </p:spPr>
         <p:txBody>
@@ -1363,39 +1368,39 @@
           <a:lstStyle>
             <a:lvl1pPr marL="0" indent="0">
               <a:buNone/>
-              <a:defRPr sz="2034" b="1"/>
+              <a:defRPr sz="4068" b="1"/>
             </a:lvl1pPr>
-            <a:lvl2pPr marL="387477" indent="0">
-              <a:buNone/>
-              <a:defRPr sz="1695" b="1"/>
+            <a:lvl2pPr marL="775000" indent="0">
+              <a:buNone/>
+              <a:defRPr sz="3390" b="1"/>
             </a:lvl2pPr>
-            <a:lvl3pPr marL="774954" indent="0">
-              <a:buNone/>
-              <a:defRPr sz="1526" b="1"/>
+            <a:lvl3pPr marL="1549999" indent="0">
+              <a:buNone/>
+              <a:defRPr sz="3051" b="1"/>
             </a:lvl3pPr>
-            <a:lvl4pPr marL="1162431" indent="0">
-              <a:buNone/>
-              <a:defRPr sz="1356" b="1"/>
+            <a:lvl4pPr marL="2324999" indent="0">
+              <a:buNone/>
+              <a:defRPr sz="2712" b="1"/>
             </a:lvl4pPr>
-            <a:lvl5pPr marL="1549908" indent="0">
-              <a:buNone/>
-              <a:defRPr sz="1356" b="1"/>
+            <a:lvl5pPr marL="3099999" indent="0">
+              <a:buNone/>
+              <a:defRPr sz="2712" b="1"/>
             </a:lvl5pPr>
-            <a:lvl6pPr marL="1937385" indent="0">
-              <a:buNone/>
-              <a:defRPr sz="1356" b="1"/>
+            <a:lvl6pPr marL="3874999" indent="0">
+              <a:buNone/>
+              <a:defRPr sz="2712" b="1"/>
             </a:lvl6pPr>
-            <a:lvl7pPr marL="2324862" indent="0">
-              <a:buNone/>
-              <a:defRPr sz="1356" b="1"/>
+            <a:lvl7pPr marL="4649998" indent="0">
+              <a:buNone/>
+              <a:defRPr sz="2712" b="1"/>
             </a:lvl7pPr>
-            <a:lvl8pPr marL="2712339" indent="0">
-              <a:buNone/>
-              <a:defRPr sz="1356" b="1"/>
+            <a:lvl8pPr marL="5424998" indent="0">
+              <a:buNone/>
+              <a:defRPr sz="2712" b="1"/>
             </a:lvl8pPr>
-            <a:lvl9pPr marL="3099816" indent="0">
-              <a:buNone/>
-              <a:defRPr sz="1356" b="1"/>
+            <a:lvl9pPr marL="6199998" indent="0">
+              <a:buNone/>
+              <a:defRPr sz="2712" b="1"/>
             </a:lvl9pPr>
           </a:lstStyle>
           <a:p>
@@ -1419,8 +1424,8 @@
         </p:nvSpPr>
         <p:spPr>
           <a:xfrm>
-            <a:off x="711743" y="2338070"/>
-            <a:ext cx="4371359" cy="3438949"/>
+            <a:off x="1423485" y="4676140"/>
+            <a:ext cx="8742718" cy="6877898"/>
           </a:xfrm>
         </p:spPr>
         <p:txBody>
@@ -1476,8 +1481,8 @@
         </p:nvSpPr>
         <p:spPr>
           <a:xfrm>
-            <a:off x="5231100" y="1569085"/>
-            <a:ext cx="4392887" cy="768985"/>
+            <a:off x="10462200" y="3138171"/>
+            <a:ext cx="8785774" cy="1537969"/>
           </a:xfrm>
         </p:spPr>
         <p:txBody>
@@ -1485,39 +1490,39 @@
           <a:lstStyle>
             <a:lvl1pPr marL="0" indent="0">
               <a:buNone/>
-              <a:defRPr sz="2034" b="1"/>
+              <a:defRPr sz="4068" b="1"/>
             </a:lvl1pPr>
-            <a:lvl2pPr marL="387477" indent="0">
-              <a:buNone/>
-              <a:defRPr sz="1695" b="1"/>
+            <a:lvl2pPr marL="775000" indent="0">
+              <a:buNone/>
+              <a:defRPr sz="3390" b="1"/>
             </a:lvl2pPr>
-            <a:lvl3pPr marL="774954" indent="0">
-              <a:buNone/>
-              <a:defRPr sz="1526" b="1"/>
+            <a:lvl3pPr marL="1549999" indent="0">
+              <a:buNone/>
+              <a:defRPr sz="3051" b="1"/>
             </a:lvl3pPr>
-            <a:lvl4pPr marL="1162431" indent="0">
-              <a:buNone/>
-              <a:defRPr sz="1356" b="1"/>
+            <a:lvl4pPr marL="2324999" indent="0">
+              <a:buNone/>
+              <a:defRPr sz="2712" b="1"/>
             </a:lvl4pPr>
-            <a:lvl5pPr marL="1549908" indent="0">
-              <a:buNone/>
-              <a:defRPr sz="1356" b="1"/>
+            <a:lvl5pPr marL="3099999" indent="0">
+              <a:buNone/>
+              <a:defRPr sz="2712" b="1"/>
             </a:lvl5pPr>
-            <a:lvl6pPr marL="1937385" indent="0">
-              <a:buNone/>
-              <a:defRPr sz="1356" b="1"/>
+            <a:lvl6pPr marL="3874999" indent="0">
+              <a:buNone/>
+              <a:defRPr sz="2712" b="1"/>
             </a:lvl6pPr>
-            <a:lvl7pPr marL="2324862" indent="0">
-              <a:buNone/>
-              <a:defRPr sz="1356" b="1"/>
+            <a:lvl7pPr marL="4649998" indent="0">
+              <a:buNone/>
+              <a:defRPr sz="2712" b="1"/>
             </a:lvl7pPr>
-            <a:lvl8pPr marL="2712339" indent="0">
-              <a:buNone/>
-              <a:defRPr sz="1356" b="1"/>
+            <a:lvl8pPr marL="5424998" indent="0">
+              <a:buNone/>
+              <a:defRPr sz="2712" b="1"/>
             </a:lvl8pPr>
-            <a:lvl9pPr marL="3099816" indent="0">
-              <a:buNone/>
-              <a:defRPr sz="1356" b="1"/>
+            <a:lvl9pPr marL="6199998" indent="0">
+              <a:buNone/>
+              <a:defRPr sz="2712" b="1"/>
             </a:lvl9pPr>
           </a:lstStyle>
           <a:p>
@@ -1541,8 +1546,8 @@
         </p:nvSpPr>
         <p:spPr>
           <a:xfrm>
-            <a:off x="5231100" y="2338070"/>
-            <a:ext cx="4392887" cy="3438949"/>
+            <a:off x="10462200" y="4676140"/>
+            <a:ext cx="8785774" cy="6877898"/>
           </a:xfrm>
         </p:spPr>
         <p:txBody>
@@ -1654,7 +1659,7 @@
     </p:spTree>
     <p:extLst>
       <p:ext uri="{BB962C8B-B14F-4D97-AF65-F5344CB8AC3E}">
-        <p14:creationId xmlns:p14="http://schemas.microsoft.com/office/powerpoint/2010/main" val="90362618"/>
+        <p14:creationId xmlns:p14="http://schemas.microsoft.com/office/powerpoint/2010/main" val="1058848705"/>
       </p:ext>
     </p:extLst>
   </p:cSld>
@@ -1772,7 +1777,7 @@
     </p:spTree>
     <p:extLst>
       <p:ext uri="{BB962C8B-B14F-4D97-AF65-F5344CB8AC3E}">
-        <p14:creationId xmlns:p14="http://schemas.microsoft.com/office/powerpoint/2010/main" val="2497044732"/>
+        <p14:creationId xmlns:p14="http://schemas.microsoft.com/office/powerpoint/2010/main" val="2950495361"/>
       </p:ext>
     </p:extLst>
   </p:cSld>
@@ -1867,7 +1872,7 @@
     </p:spTree>
     <p:extLst>
       <p:ext uri="{BB962C8B-B14F-4D97-AF65-F5344CB8AC3E}">
-        <p14:creationId xmlns:p14="http://schemas.microsoft.com/office/powerpoint/2010/main" val="577193693"/>
+        <p14:creationId xmlns:p14="http://schemas.microsoft.com/office/powerpoint/2010/main" val="3720474530"/>
       </p:ext>
     </p:extLst>
   </p:cSld>
@@ -1906,165 +1911,165 @@
         </p:nvSpPr>
         <p:spPr>
           <a:xfrm>
-            <a:off x="711743" y="426720"/>
-            <a:ext cx="3332673" cy="1493520"/>
+            <a:off x="1423485" y="853440"/>
+            <a:ext cx="6665347" cy="2987040"/>
           </a:xfrm>
         </p:spPr>
         <p:txBody>
           <a:bodyPr anchor="b"/>
           <a:lstStyle>
             <a:lvl1pPr>
+              <a:defRPr sz="5424"/>
+            </a:lvl1pPr>
+          </a:lstStyle>
+          <a:p>
+            <a:r>
+              <a:rPr lang="en-US"/>
+              <a:t>Click to edit Master title style</a:t>
+            </a:r>
+            <a:endParaRPr lang="en-US" dirty="0"/>
+          </a:p>
+        </p:txBody>
+      </p:sp>
+      <p:sp>
+        <p:nvSpPr>
+          <p:cNvPr id="3" name="Content Placeholder 2"/>
+          <p:cNvSpPr>
+            <a:spLocks noGrp="1"/>
+          </p:cNvSpPr>
+          <p:nvPr>
+            <p:ph idx="1"/>
+          </p:nvPr>
+        </p:nvSpPr>
+        <p:spPr>
+          <a:xfrm>
+            <a:off x="8785774" y="1843194"/>
+            <a:ext cx="10462200" cy="9097433"/>
+          </a:xfrm>
+        </p:spPr>
+        <p:txBody>
+          <a:bodyPr/>
+          <a:lstStyle>
+            <a:lvl1pPr>
+              <a:defRPr sz="5424"/>
+            </a:lvl1pPr>
+            <a:lvl2pPr>
+              <a:defRPr sz="4746"/>
+            </a:lvl2pPr>
+            <a:lvl3pPr>
+              <a:defRPr sz="4068"/>
+            </a:lvl3pPr>
+            <a:lvl4pPr>
+              <a:defRPr sz="3390"/>
+            </a:lvl4pPr>
+            <a:lvl5pPr>
+              <a:defRPr sz="3390"/>
+            </a:lvl5pPr>
+            <a:lvl6pPr>
+              <a:defRPr sz="3390"/>
+            </a:lvl6pPr>
+            <a:lvl7pPr>
+              <a:defRPr sz="3390"/>
+            </a:lvl7pPr>
+            <a:lvl8pPr>
+              <a:defRPr sz="3390"/>
+            </a:lvl8pPr>
+            <a:lvl9pPr>
+              <a:defRPr sz="3390"/>
+            </a:lvl9pPr>
+          </a:lstStyle>
+          <a:p>
+            <a:pPr lvl="0"/>
+            <a:r>
+              <a:rPr lang="en-US"/>
+              <a:t>Click to edit Master text styles</a:t>
+            </a:r>
+          </a:p>
+          <a:p>
+            <a:pPr lvl="1"/>
+            <a:r>
+              <a:rPr lang="en-US"/>
+              <a:t>Second level</a:t>
+            </a:r>
+          </a:p>
+          <a:p>
+            <a:pPr lvl="2"/>
+            <a:r>
+              <a:rPr lang="en-US"/>
+              <a:t>Third level</a:t>
+            </a:r>
+          </a:p>
+          <a:p>
+            <a:pPr lvl="3"/>
+            <a:r>
+              <a:rPr lang="en-US"/>
+              <a:t>Fourth level</a:t>
+            </a:r>
+          </a:p>
+          <a:p>
+            <a:pPr lvl="4"/>
+            <a:r>
+              <a:rPr lang="en-US"/>
+              <a:t>Fifth level</a:t>
+            </a:r>
+            <a:endParaRPr lang="en-US" dirty="0"/>
+          </a:p>
+        </p:txBody>
+      </p:sp>
+      <p:sp>
+        <p:nvSpPr>
+          <p:cNvPr id="4" name="Text Placeholder 3"/>
+          <p:cNvSpPr>
+            <a:spLocks noGrp="1"/>
+          </p:cNvSpPr>
+          <p:nvPr>
+            <p:ph type="body" sz="half" idx="2"/>
+          </p:nvPr>
+        </p:nvSpPr>
+        <p:spPr>
+          <a:xfrm>
+            <a:off x="1423485" y="3840480"/>
+            <a:ext cx="6665347" cy="7114964"/>
+          </a:xfrm>
+        </p:spPr>
+        <p:txBody>
+          <a:bodyPr/>
+          <a:lstStyle>
+            <a:lvl1pPr marL="0" indent="0">
+              <a:buNone/>
               <a:defRPr sz="2712"/>
             </a:lvl1pPr>
-          </a:lstStyle>
-          <a:p>
-            <a:r>
-              <a:rPr lang="en-US"/>
-              <a:t>Click to edit Master title style</a:t>
-            </a:r>
-            <a:endParaRPr lang="en-US" dirty="0"/>
-          </a:p>
-        </p:txBody>
-      </p:sp>
-      <p:sp>
-        <p:nvSpPr>
-          <p:cNvPr id="3" name="Content Placeholder 2"/>
-          <p:cNvSpPr>
-            <a:spLocks noGrp="1"/>
-          </p:cNvSpPr>
-          <p:nvPr>
-            <p:ph idx="1"/>
-          </p:nvPr>
-        </p:nvSpPr>
-        <p:spPr>
-          <a:xfrm>
-            <a:off x="4392887" y="921597"/>
-            <a:ext cx="5231100" cy="4548717"/>
-          </a:xfrm>
-        </p:spPr>
-        <p:txBody>
-          <a:bodyPr/>
-          <a:lstStyle>
-            <a:lvl1pPr>
-              <a:defRPr sz="2712"/>
-            </a:lvl1pPr>
-            <a:lvl2pPr>
+            <a:lvl2pPr marL="775000" indent="0">
+              <a:buNone/>
               <a:defRPr sz="2373"/>
             </a:lvl2pPr>
-            <a:lvl3pPr>
+            <a:lvl3pPr marL="1549999" indent="0">
+              <a:buNone/>
               <a:defRPr sz="2034"/>
             </a:lvl3pPr>
-            <a:lvl4pPr>
+            <a:lvl4pPr marL="2324999" indent="0">
+              <a:buNone/>
               <a:defRPr sz="1695"/>
             </a:lvl4pPr>
-            <a:lvl5pPr>
+            <a:lvl5pPr marL="3099999" indent="0">
+              <a:buNone/>
               <a:defRPr sz="1695"/>
             </a:lvl5pPr>
-            <a:lvl6pPr>
+            <a:lvl6pPr marL="3874999" indent="0">
+              <a:buNone/>
               <a:defRPr sz="1695"/>
             </a:lvl6pPr>
-            <a:lvl7pPr>
+            <a:lvl7pPr marL="4649998" indent="0">
+              <a:buNone/>
               <a:defRPr sz="1695"/>
             </a:lvl7pPr>
-            <a:lvl8pPr>
+            <a:lvl8pPr marL="5424998" indent="0">
+              <a:buNone/>
               <a:defRPr sz="1695"/>
             </a:lvl8pPr>
-            <a:lvl9pPr>
+            <a:lvl9pPr marL="6199998" indent="0">
+              <a:buNone/>
               <a:defRPr sz="1695"/>
-            </a:lvl9pPr>
-          </a:lstStyle>
-          <a:p>
-            <a:pPr lvl="0"/>
-            <a:r>
-              <a:rPr lang="en-US"/>
-              <a:t>Click to edit Master text styles</a:t>
-            </a:r>
-          </a:p>
-          <a:p>
-            <a:pPr lvl="1"/>
-            <a:r>
-              <a:rPr lang="en-US"/>
-              <a:t>Second level</a:t>
-            </a:r>
-          </a:p>
-          <a:p>
-            <a:pPr lvl="2"/>
-            <a:r>
-              <a:rPr lang="en-US"/>
-              <a:t>Third level</a:t>
-            </a:r>
-          </a:p>
-          <a:p>
-            <a:pPr lvl="3"/>
-            <a:r>
-              <a:rPr lang="en-US"/>
-              <a:t>Fourth level</a:t>
-            </a:r>
-          </a:p>
-          <a:p>
-            <a:pPr lvl="4"/>
-            <a:r>
-              <a:rPr lang="en-US"/>
-              <a:t>Fifth level</a:t>
-            </a:r>
-            <a:endParaRPr lang="en-US" dirty="0"/>
-          </a:p>
-        </p:txBody>
-      </p:sp>
-      <p:sp>
-        <p:nvSpPr>
-          <p:cNvPr id="4" name="Text Placeholder 3"/>
-          <p:cNvSpPr>
-            <a:spLocks noGrp="1"/>
-          </p:cNvSpPr>
-          <p:nvPr>
-            <p:ph type="body" sz="half" idx="2"/>
-          </p:nvPr>
-        </p:nvSpPr>
-        <p:spPr>
-          <a:xfrm>
-            <a:off x="711743" y="1920240"/>
-            <a:ext cx="3332673" cy="3557482"/>
-          </a:xfrm>
-        </p:spPr>
-        <p:txBody>
-          <a:bodyPr/>
-          <a:lstStyle>
-            <a:lvl1pPr marL="0" indent="0">
-              <a:buNone/>
-              <a:defRPr sz="1356"/>
-            </a:lvl1pPr>
-            <a:lvl2pPr marL="387477" indent="0">
-              <a:buNone/>
-              <a:defRPr sz="1187"/>
-            </a:lvl2pPr>
-            <a:lvl3pPr marL="774954" indent="0">
-              <a:buNone/>
-              <a:defRPr sz="1017"/>
-            </a:lvl3pPr>
-            <a:lvl4pPr marL="1162431" indent="0">
-              <a:buNone/>
-              <a:defRPr sz="848"/>
-            </a:lvl4pPr>
-            <a:lvl5pPr marL="1549908" indent="0">
-              <a:buNone/>
-              <a:defRPr sz="848"/>
-            </a:lvl5pPr>
-            <a:lvl6pPr marL="1937385" indent="0">
-              <a:buNone/>
-              <a:defRPr sz="848"/>
-            </a:lvl6pPr>
-            <a:lvl7pPr marL="2324862" indent="0">
-              <a:buNone/>
-              <a:defRPr sz="848"/>
-            </a:lvl7pPr>
-            <a:lvl8pPr marL="2712339" indent="0">
-              <a:buNone/>
-              <a:defRPr sz="848"/>
-            </a:lvl8pPr>
-            <a:lvl9pPr marL="3099816" indent="0">
-              <a:buNone/>
-              <a:defRPr sz="848"/>
             </a:lvl9pPr>
           </a:lstStyle>
           <a:p>
@@ -2144,7 +2149,7 @@
     </p:spTree>
     <p:extLst>
       <p:ext uri="{BB962C8B-B14F-4D97-AF65-F5344CB8AC3E}">
-        <p14:creationId xmlns:p14="http://schemas.microsoft.com/office/powerpoint/2010/main" val="218252409"/>
+        <p14:creationId xmlns:p14="http://schemas.microsoft.com/office/powerpoint/2010/main" val="1105549814"/>
       </p:ext>
     </p:extLst>
   </p:cSld>
@@ -2183,15 +2188,15 @@
         </p:nvSpPr>
         <p:spPr>
           <a:xfrm>
-            <a:off x="711743" y="426720"/>
-            <a:ext cx="3332673" cy="1493520"/>
+            <a:off x="1423485" y="853440"/>
+            <a:ext cx="6665347" cy="2987040"/>
           </a:xfrm>
         </p:spPr>
         <p:txBody>
           <a:bodyPr anchor="b"/>
           <a:lstStyle>
             <a:lvl1pPr>
-              <a:defRPr sz="2712"/>
+              <a:defRPr sz="5424"/>
             </a:lvl1pPr>
           </a:lstStyle>
           <a:p>
@@ -2215,8 +2220,8 @@
         </p:nvSpPr>
         <p:spPr>
           <a:xfrm>
-            <a:off x="4392887" y="921597"/>
-            <a:ext cx="5231100" cy="4548717"/>
+            <a:off x="8785774" y="1843194"/>
+            <a:ext cx="10462200" cy="9097433"/>
           </a:xfrm>
         </p:spPr>
         <p:txBody>
@@ -2224,104 +2229,104 @@
           <a:lstStyle>
             <a:lvl1pPr marL="0" indent="0">
               <a:buNone/>
+              <a:defRPr sz="5424"/>
+            </a:lvl1pPr>
+            <a:lvl2pPr marL="775000" indent="0">
+              <a:buNone/>
+              <a:defRPr sz="4746"/>
+            </a:lvl2pPr>
+            <a:lvl3pPr marL="1549999" indent="0">
+              <a:buNone/>
+              <a:defRPr sz="4068"/>
+            </a:lvl3pPr>
+            <a:lvl4pPr marL="2324999" indent="0">
+              <a:buNone/>
+              <a:defRPr sz="3390"/>
+            </a:lvl4pPr>
+            <a:lvl5pPr marL="3099999" indent="0">
+              <a:buNone/>
+              <a:defRPr sz="3390"/>
+            </a:lvl5pPr>
+            <a:lvl6pPr marL="3874999" indent="0">
+              <a:buNone/>
+              <a:defRPr sz="3390"/>
+            </a:lvl6pPr>
+            <a:lvl7pPr marL="4649998" indent="0">
+              <a:buNone/>
+              <a:defRPr sz="3390"/>
+            </a:lvl7pPr>
+            <a:lvl8pPr marL="5424998" indent="0">
+              <a:buNone/>
+              <a:defRPr sz="3390"/>
+            </a:lvl8pPr>
+            <a:lvl9pPr marL="6199998" indent="0">
+              <a:buNone/>
+              <a:defRPr sz="3390"/>
+            </a:lvl9pPr>
+          </a:lstStyle>
+          <a:p>
+            <a:r>
+              <a:rPr lang="en-US"/>
+              <a:t>Click icon to add picture</a:t>
+            </a:r>
+            <a:endParaRPr lang="en-US" dirty="0"/>
+          </a:p>
+        </p:txBody>
+      </p:sp>
+      <p:sp>
+        <p:nvSpPr>
+          <p:cNvPr id="4" name="Text Placeholder 3"/>
+          <p:cNvSpPr>
+            <a:spLocks noGrp="1"/>
+          </p:cNvSpPr>
+          <p:nvPr>
+            <p:ph type="body" sz="half" idx="2"/>
+          </p:nvPr>
+        </p:nvSpPr>
+        <p:spPr>
+          <a:xfrm>
+            <a:off x="1423485" y="3840480"/>
+            <a:ext cx="6665347" cy="7114964"/>
+          </a:xfrm>
+        </p:spPr>
+        <p:txBody>
+          <a:bodyPr/>
+          <a:lstStyle>
+            <a:lvl1pPr marL="0" indent="0">
+              <a:buNone/>
               <a:defRPr sz="2712"/>
             </a:lvl1pPr>
-            <a:lvl2pPr marL="387477" indent="0">
+            <a:lvl2pPr marL="775000" indent="0">
               <a:buNone/>
               <a:defRPr sz="2373"/>
             </a:lvl2pPr>
-            <a:lvl3pPr marL="774954" indent="0">
+            <a:lvl3pPr marL="1549999" indent="0">
               <a:buNone/>
               <a:defRPr sz="2034"/>
             </a:lvl3pPr>
-            <a:lvl4pPr marL="1162431" indent="0">
+            <a:lvl4pPr marL="2324999" indent="0">
               <a:buNone/>
               <a:defRPr sz="1695"/>
             </a:lvl4pPr>
-            <a:lvl5pPr marL="1549908" indent="0">
+            <a:lvl5pPr marL="3099999" indent="0">
               <a:buNone/>
               <a:defRPr sz="1695"/>
             </a:lvl5pPr>
-            <a:lvl6pPr marL="1937385" indent="0">
+            <a:lvl6pPr marL="3874999" indent="0">
               <a:buNone/>
               <a:defRPr sz="1695"/>
             </a:lvl6pPr>
-            <a:lvl7pPr marL="2324862" indent="0">
+            <a:lvl7pPr marL="4649998" indent="0">
               <a:buNone/>
               <a:defRPr sz="1695"/>
             </a:lvl7pPr>
-            <a:lvl8pPr marL="2712339" indent="0">
+            <a:lvl8pPr marL="5424998" indent="0">
               <a:buNone/>
               <a:defRPr sz="1695"/>
             </a:lvl8pPr>
-            <a:lvl9pPr marL="3099816" indent="0">
+            <a:lvl9pPr marL="6199998" indent="0">
               <a:buNone/>
               <a:defRPr sz="1695"/>
-            </a:lvl9pPr>
-          </a:lstStyle>
-          <a:p>
-            <a:r>
-              <a:rPr lang="en-US"/>
-              <a:t>Click icon to add picture</a:t>
-            </a:r>
-            <a:endParaRPr lang="en-US" dirty="0"/>
-          </a:p>
-        </p:txBody>
-      </p:sp>
-      <p:sp>
-        <p:nvSpPr>
-          <p:cNvPr id="4" name="Text Placeholder 3"/>
-          <p:cNvSpPr>
-            <a:spLocks noGrp="1"/>
-          </p:cNvSpPr>
-          <p:nvPr>
-            <p:ph type="body" sz="half" idx="2"/>
-          </p:nvPr>
-        </p:nvSpPr>
-        <p:spPr>
-          <a:xfrm>
-            <a:off x="711743" y="1920240"/>
-            <a:ext cx="3332673" cy="3557482"/>
-          </a:xfrm>
-        </p:spPr>
-        <p:txBody>
-          <a:bodyPr/>
-          <a:lstStyle>
-            <a:lvl1pPr marL="0" indent="0">
-              <a:buNone/>
-              <a:defRPr sz="1356"/>
-            </a:lvl1pPr>
-            <a:lvl2pPr marL="387477" indent="0">
-              <a:buNone/>
-              <a:defRPr sz="1187"/>
-            </a:lvl2pPr>
-            <a:lvl3pPr marL="774954" indent="0">
-              <a:buNone/>
-              <a:defRPr sz="1017"/>
-            </a:lvl3pPr>
-            <a:lvl4pPr marL="1162431" indent="0">
-              <a:buNone/>
-              <a:defRPr sz="848"/>
-            </a:lvl4pPr>
-            <a:lvl5pPr marL="1549908" indent="0">
-              <a:buNone/>
-              <a:defRPr sz="848"/>
-            </a:lvl5pPr>
-            <a:lvl6pPr marL="1937385" indent="0">
-              <a:buNone/>
-              <a:defRPr sz="848"/>
-            </a:lvl6pPr>
-            <a:lvl7pPr marL="2324862" indent="0">
-              <a:buNone/>
-              <a:defRPr sz="848"/>
-            </a:lvl7pPr>
-            <a:lvl8pPr marL="2712339" indent="0">
-              <a:buNone/>
-              <a:defRPr sz="848"/>
-            </a:lvl8pPr>
-            <a:lvl9pPr marL="3099816" indent="0">
-              <a:buNone/>
-              <a:defRPr sz="848"/>
             </a:lvl9pPr>
           </a:lstStyle>
           <a:p>
@@ -2401,7 +2406,7 @@
     </p:spTree>
     <p:extLst>
       <p:ext uri="{BB962C8B-B14F-4D97-AF65-F5344CB8AC3E}">
-        <p14:creationId xmlns:p14="http://schemas.microsoft.com/office/powerpoint/2010/main" val="1227296112"/>
+        <p14:creationId xmlns:p14="http://schemas.microsoft.com/office/powerpoint/2010/main" val="1733129802"/>
       </p:ext>
     </p:extLst>
   </p:cSld>
@@ -2445,8 +2450,8 @@
         </p:nvSpPr>
         <p:spPr>
           <a:xfrm>
-            <a:off x="710397" y="340784"/>
-            <a:ext cx="8912245" cy="1237192"/>
+            <a:off x="1420793" y="681568"/>
+            <a:ext cx="17824490" cy="2474384"/>
           </a:xfrm>
           <a:prstGeom prst="rect">
             <a:avLst/>
@@ -2478,8 +2483,8 @@
         </p:nvSpPr>
         <p:spPr>
           <a:xfrm>
-            <a:off x="710397" y="1703917"/>
-            <a:ext cx="8912245" cy="4061249"/>
+            <a:off x="1420793" y="3407833"/>
+            <a:ext cx="17824490" cy="8122498"/>
           </a:xfrm>
           <a:prstGeom prst="rect">
             <a:avLst/>
@@ -2540,8 +2545,8 @@
         </p:nvSpPr>
         <p:spPr>
           <a:xfrm>
-            <a:off x="710396" y="5932594"/>
-            <a:ext cx="2324934" cy="340783"/>
+            <a:off x="1420793" y="11865187"/>
+            <a:ext cx="4649867" cy="681567"/>
           </a:xfrm>
           <a:prstGeom prst="rect">
             <a:avLst/>
@@ -2551,7 +2556,7 @@
           <a:bodyPr vert="horz" lIns="91440" tIns="45720" rIns="91440" bIns="45720" rtlCol="0" anchor="ctr"/>
           <a:lstStyle>
             <a:lvl1pPr algn="l">
-              <a:defRPr sz="1017">
+              <a:defRPr sz="2034">
                 <a:solidFill>
                   <a:schemeClr val="tx1">
                     <a:tint val="75000"/>
@@ -2581,8 +2586,8 @@
         </p:nvSpPr>
         <p:spPr>
           <a:xfrm>
-            <a:off x="3422819" y="5932594"/>
-            <a:ext cx="3487400" cy="340783"/>
+            <a:off x="6845638" y="11865187"/>
+            <a:ext cx="6974800" cy="681567"/>
           </a:xfrm>
           <a:prstGeom prst="rect">
             <a:avLst/>
@@ -2592,7 +2597,7 @@
           <a:bodyPr vert="horz" lIns="91440" tIns="45720" rIns="91440" bIns="45720" rtlCol="0" anchor="ctr"/>
           <a:lstStyle>
             <a:lvl1pPr algn="ctr">
-              <a:defRPr sz="1017">
+              <a:defRPr sz="2034">
                 <a:solidFill>
                   <a:schemeClr val="tx1">
                     <a:tint val="75000"/>
@@ -2618,8 +2623,8 @@
         </p:nvSpPr>
         <p:spPr>
           <a:xfrm>
-            <a:off x="7297708" y="5932594"/>
-            <a:ext cx="2324934" cy="340783"/>
+            <a:off x="14595415" y="11865187"/>
+            <a:ext cx="4649867" cy="681567"/>
           </a:xfrm>
           <a:prstGeom prst="rect">
             <a:avLst/>
@@ -2629,7 +2634,7 @@
           <a:bodyPr vert="horz" lIns="91440" tIns="45720" rIns="91440" bIns="45720" rtlCol="0" anchor="ctr"/>
           <a:lstStyle>
             <a:lvl1pPr algn="r">
-              <a:defRPr sz="1017">
+              <a:defRPr sz="2034">
                 <a:solidFill>
                   <a:schemeClr val="tx1">
                     <a:tint val="75000"/>
@@ -2650,27 +2655,27 @@
     </p:spTree>
     <p:extLst>
       <p:ext uri="{BB962C8B-B14F-4D97-AF65-F5344CB8AC3E}">
-        <p14:creationId xmlns:p14="http://schemas.microsoft.com/office/powerpoint/2010/main" val="2797639244"/>
+        <p14:creationId xmlns:p14="http://schemas.microsoft.com/office/powerpoint/2010/main" val="1283560404"/>
       </p:ext>
     </p:extLst>
   </p:cSld>
   <p:clrMap bg1="lt1" tx1="dk1" bg2="lt2" tx2="dk2" accent1="accent1" accent2="accent2" accent3="accent3" accent4="accent4" accent5="accent5" accent6="accent6" hlink="hlink" folHlink="folHlink"/>
   <p:sldLayoutIdLst>
-    <p:sldLayoutId id="2147483685" r:id="rId1"/>
-    <p:sldLayoutId id="2147483686" r:id="rId2"/>
-    <p:sldLayoutId id="2147483687" r:id="rId3"/>
-    <p:sldLayoutId id="2147483688" r:id="rId4"/>
-    <p:sldLayoutId id="2147483689" r:id="rId5"/>
-    <p:sldLayoutId id="2147483690" r:id="rId6"/>
-    <p:sldLayoutId id="2147483691" r:id="rId7"/>
-    <p:sldLayoutId id="2147483692" r:id="rId8"/>
-    <p:sldLayoutId id="2147483693" r:id="rId9"/>
-    <p:sldLayoutId id="2147483694" r:id="rId10"/>
-    <p:sldLayoutId id="2147483695" r:id="rId11"/>
+    <p:sldLayoutId id="2147483697" r:id="rId1"/>
+    <p:sldLayoutId id="2147483698" r:id="rId2"/>
+    <p:sldLayoutId id="2147483699" r:id="rId3"/>
+    <p:sldLayoutId id="2147483700" r:id="rId4"/>
+    <p:sldLayoutId id="2147483701" r:id="rId5"/>
+    <p:sldLayoutId id="2147483702" r:id="rId6"/>
+    <p:sldLayoutId id="2147483703" r:id="rId7"/>
+    <p:sldLayoutId id="2147483704" r:id="rId8"/>
+    <p:sldLayoutId id="2147483705" r:id="rId9"/>
+    <p:sldLayoutId id="2147483706" r:id="rId10"/>
+    <p:sldLayoutId id="2147483707" r:id="rId11"/>
   </p:sldLayoutIdLst>
   <p:txStyles>
     <p:titleStyle>
-      <a:lvl1pPr algn="l" defTabSz="774954" rtl="0" eaLnBrk="1" latinLnBrk="0" hangingPunct="1">
+      <a:lvl1pPr algn="l" defTabSz="1549999" rtl="0" eaLnBrk="1" latinLnBrk="0" hangingPunct="1">
         <a:lnSpc>
           <a:spcPct val="90000"/>
         </a:lnSpc>
@@ -2678,7 +2683,7 @@
           <a:spcPct val="0"/>
         </a:spcBef>
         <a:buNone/>
-        <a:defRPr sz="3729" kern="1200">
+        <a:defRPr sz="7458" kern="1200">
           <a:solidFill>
             <a:schemeClr val="tx1"/>
           </a:solidFill>
@@ -2689,7 +2694,25 @@
       </a:lvl1pPr>
     </p:titleStyle>
     <p:bodyStyle>
-      <a:lvl1pPr marL="193739" indent="-193739" algn="l" defTabSz="774954" rtl="0" eaLnBrk="1" latinLnBrk="0" hangingPunct="1">
+      <a:lvl1pPr marL="387500" indent="-387500" algn="l" defTabSz="1549999" rtl="0" eaLnBrk="1" latinLnBrk="0" hangingPunct="1">
+        <a:lnSpc>
+          <a:spcPct val="90000"/>
+        </a:lnSpc>
+        <a:spcBef>
+          <a:spcPts val="1695"/>
+        </a:spcBef>
+        <a:buFont typeface="Arial" panose="020B0604020202020204" pitchFamily="34" charset="0"/>
+        <a:buChar char="•"/>
+        <a:defRPr sz="4746" kern="1200">
+          <a:solidFill>
+            <a:schemeClr val="tx1"/>
+          </a:solidFill>
+          <a:latin typeface="+mn-lt"/>
+          <a:ea typeface="+mn-ea"/>
+          <a:cs typeface="+mn-cs"/>
+        </a:defRPr>
+      </a:lvl1pPr>
+      <a:lvl2pPr marL="1162500" indent="-387500" algn="l" defTabSz="1549999" rtl="0" eaLnBrk="1" latinLnBrk="0" hangingPunct="1">
         <a:lnSpc>
           <a:spcPct val="90000"/>
         </a:lnSpc>
@@ -2698,25 +2721,7 @@
         </a:spcBef>
         <a:buFont typeface="Arial" panose="020B0604020202020204" pitchFamily="34" charset="0"/>
         <a:buChar char="•"/>
-        <a:defRPr sz="2373" kern="1200">
-          <a:solidFill>
-            <a:schemeClr val="tx1"/>
-          </a:solidFill>
-          <a:latin typeface="+mn-lt"/>
-          <a:ea typeface="+mn-ea"/>
-          <a:cs typeface="+mn-cs"/>
-        </a:defRPr>
-      </a:lvl1pPr>
-      <a:lvl2pPr marL="581216" indent="-193739" algn="l" defTabSz="774954" rtl="0" eaLnBrk="1" latinLnBrk="0" hangingPunct="1">
-        <a:lnSpc>
-          <a:spcPct val="90000"/>
-        </a:lnSpc>
-        <a:spcBef>
-          <a:spcPts val="424"/>
-        </a:spcBef>
-        <a:buFont typeface="Arial" panose="020B0604020202020204" pitchFamily="34" charset="0"/>
-        <a:buChar char="•"/>
-        <a:defRPr sz="2034" kern="1200">
+        <a:defRPr sz="4068" kern="1200">
           <a:solidFill>
             <a:schemeClr val="tx1"/>
           </a:solidFill>
@@ -2725,16 +2730,16 @@
           <a:cs typeface="+mn-cs"/>
         </a:defRPr>
       </a:lvl2pPr>
-      <a:lvl3pPr marL="968693" indent="-193739" algn="l" defTabSz="774954" rtl="0" eaLnBrk="1" latinLnBrk="0" hangingPunct="1">
+      <a:lvl3pPr marL="1937499" indent="-387500" algn="l" defTabSz="1549999" rtl="0" eaLnBrk="1" latinLnBrk="0" hangingPunct="1">
         <a:lnSpc>
           <a:spcPct val="90000"/>
         </a:lnSpc>
         <a:spcBef>
-          <a:spcPts val="424"/>
+          <a:spcPts val="848"/>
         </a:spcBef>
         <a:buFont typeface="Arial" panose="020B0604020202020204" pitchFamily="34" charset="0"/>
         <a:buChar char="•"/>
-        <a:defRPr sz="1695" kern="1200">
+        <a:defRPr sz="3390" kern="1200">
           <a:solidFill>
             <a:schemeClr val="tx1"/>
           </a:solidFill>
@@ -2743,16 +2748,16 @@
           <a:cs typeface="+mn-cs"/>
         </a:defRPr>
       </a:lvl3pPr>
-      <a:lvl4pPr marL="1356170" indent="-193739" algn="l" defTabSz="774954" rtl="0" eaLnBrk="1" latinLnBrk="0" hangingPunct="1">
+      <a:lvl4pPr marL="2712499" indent="-387500" algn="l" defTabSz="1549999" rtl="0" eaLnBrk="1" latinLnBrk="0" hangingPunct="1">
         <a:lnSpc>
           <a:spcPct val="90000"/>
         </a:lnSpc>
         <a:spcBef>
-          <a:spcPts val="424"/>
+          <a:spcPts val="848"/>
         </a:spcBef>
         <a:buFont typeface="Arial" panose="020B0604020202020204" pitchFamily="34" charset="0"/>
         <a:buChar char="•"/>
-        <a:defRPr sz="1526" kern="1200">
+        <a:defRPr sz="3051" kern="1200">
           <a:solidFill>
             <a:schemeClr val="tx1"/>
           </a:solidFill>
@@ -2761,16 +2766,16 @@
           <a:cs typeface="+mn-cs"/>
         </a:defRPr>
       </a:lvl4pPr>
-      <a:lvl5pPr marL="1743647" indent="-193739" algn="l" defTabSz="774954" rtl="0" eaLnBrk="1" latinLnBrk="0" hangingPunct="1">
+      <a:lvl5pPr marL="3487499" indent="-387500" algn="l" defTabSz="1549999" rtl="0" eaLnBrk="1" latinLnBrk="0" hangingPunct="1">
         <a:lnSpc>
           <a:spcPct val="90000"/>
         </a:lnSpc>
         <a:spcBef>
-          <a:spcPts val="424"/>
+          <a:spcPts val="848"/>
         </a:spcBef>
         <a:buFont typeface="Arial" panose="020B0604020202020204" pitchFamily="34" charset="0"/>
         <a:buChar char="•"/>
-        <a:defRPr sz="1526" kern="1200">
+        <a:defRPr sz="3051" kern="1200">
           <a:solidFill>
             <a:schemeClr val="tx1"/>
           </a:solidFill>
@@ -2779,16 +2784,16 @@
           <a:cs typeface="+mn-cs"/>
         </a:defRPr>
       </a:lvl5pPr>
-      <a:lvl6pPr marL="2131124" indent="-193739" algn="l" defTabSz="774954" rtl="0" eaLnBrk="1" latinLnBrk="0" hangingPunct="1">
+      <a:lvl6pPr marL="4262498" indent="-387500" algn="l" defTabSz="1549999" rtl="0" eaLnBrk="1" latinLnBrk="0" hangingPunct="1">
         <a:lnSpc>
           <a:spcPct val="90000"/>
         </a:lnSpc>
         <a:spcBef>
-          <a:spcPts val="424"/>
+          <a:spcPts val="848"/>
         </a:spcBef>
         <a:buFont typeface="Arial" panose="020B0604020202020204" pitchFamily="34" charset="0"/>
         <a:buChar char="•"/>
-        <a:defRPr sz="1526" kern="1200">
+        <a:defRPr sz="3051" kern="1200">
           <a:solidFill>
             <a:schemeClr val="tx1"/>
           </a:solidFill>
@@ -2797,16 +2802,16 @@
           <a:cs typeface="+mn-cs"/>
         </a:defRPr>
       </a:lvl6pPr>
-      <a:lvl7pPr marL="2518601" indent="-193739" algn="l" defTabSz="774954" rtl="0" eaLnBrk="1" latinLnBrk="0" hangingPunct="1">
+      <a:lvl7pPr marL="5037498" indent="-387500" algn="l" defTabSz="1549999" rtl="0" eaLnBrk="1" latinLnBrk="0" hangingPunct="1">
         <a:lnSpc>
           <a:spcPct val="90000"/>
         </a:lnSpc>
         <a:spcBef>
-          <a:spcPts val="424"/>
+          <a:spcPts val="848"/>
         </a:spcBef>
         <a:buFont typeface="Arial" panose="020B0604020202020204" pitchFamily="34" charset="0"/>
         <a:buChar char="•"/>
-        <a:defRPr sz="1526" kern="1200">
+        <a:defRPr sz="3051" kern="1200">
           <a:solidFill>
             <a:schemeClr val="tx1"/>
           </a:solidFill>
@@ -2815,16 +2820,16 @@
           <a:cs typeface="+mn-cs"/>
         </a:defRPr>
       </a:lvl7pPr>
-      <a:lvl8pPr marL="2906078" indent="-193739" algn="l" defTabSz="774954" rtl="0" eaLnBrk="1" latinLnBrk="0" hangingPunct="1">
+      <a:lvl8pPr marL="5812498" indent="-387500" algn="l" defTabSz="1549999" rtl="0" eaLnBrk="1" latinLnBrk="0" hangingPunct="1">
         <a:lnSpc>
           <a:spcPct val="90000"/>
         </a:lnSpc>
         <a:spcBef>
-          <a:spcPts val="424"/>
+          <a:spcPts val="848"/>
         </a:spcBef>
         <a:buFont typeface="Arial" panose="020B0604020202020204" pitchFamily="34" charset="0"/>
         <a:buChar char="•"/>
-        <a:defRPr sz="1526" kern="1200">
+        <a:defRPr sz="3051" kern="1200">
           <a:solidFill>
             <a:schemeClr val="tx1"/>
           </a:solidFill>
@@ -2833,16 +2838,16 @@
           <a:cs typeface="+mn-cs"/>
         </a:defRPr>
       </a:lvl8pPr>
-      <a:lvl9pPr marL="3293555" indent="-193739" algn="l" defTabSz="774954" rtl="0" eaLnBrk="1" latinLnBrk="0" hangingPunct="1">
+      <a:lvl9pPr marL="6587498" indent="-387500" algn="l" defTabSz="1549999" rtl="0" eaLnBrk="1" latinLnBrk="0" hangingPunct="1">
         <a:lnSpc>
           <a:spcPct val="90000"/>
         </a:lnSpc>
         <a:spcBef>
-          <a:spcPts val="424"/>
+          <a:spcPts val="848"/>
         </a:spcBef>
         <a:buFont typeface="Arial" panose="020B0604020202020204" pitchFamily="34" charset="0"/>
         <a:buChar char="•"/>
-        <a:defRPr sz="1526" kern="1200">
+        <a:defRPr sz="3051" kern="1200">
           <a:solidFill>
             <a:schemeClr val="tx1"/>
           </a:solidFill>
@@ -2856,8 +2861,8 @@
       <a:defPPr>
         <a:defRPr lang="en-US"/>
       </a:defPPr>
-      <a:lvl1pPr marL="0" algn="l" defTabSz="774954" rtl="0" eaLnBrk="1" latinLnBrk="0" hangingPunct="1">
-        <a:defRPr sz="1526" kern="1200">
+      <a:lvl1pPr marL="0" algn="l" defTabSz="1549999" rtl="0" eaLnBrk="1" latinLnBrk="0" hangingPunct="1">
+        <a:defRPr sz="3051" kern="1200">
           <a:solidFill>
             <a:schemeClr val="tx1"/>
           </a:solidFill>
@@ -2866,8 +2871,8 @@
           <a:cs typeface="+mn-cs"/>
         </a:defRPr>
       </a:lvl1pPr>
-      <a:lvl2pPr marL="387477" algn="l" defTabSz="774954" rtl="0" eaLnBrk="1" latinLnBrk="0" hangingPunct="1">
-        <a:defRPr sz="1526" kern="1200">
+      <a:lvl2pPr marL="775000" algn="l" defTabSz="1549999" rtl="0" eaLnBrk="1" latinLnBrk="0" hangingPunct="1">
+        <a:defRPr sz="3051" kern="1200">
           <a:solidFill>
             <a:schemeClr val="tx1"/>
           </a:solidFill>
@@ -2876,8 +2881,8 @@
           <a:cs typeface="+mn-cs"/>
         </a:defRPr>
       </a:lvl2pPr>
-      <a:lvl3pPr marL="774954" algn="l" defTabSz="774954" rtl="0" eaLnBrk="1" latinLnBrk="0" hangingPunct="1">
-        <a:defRPr sz="1526" kern="1200">
+      <a:lvl3pPr marL="1549999" algn="l" defTabSz="1549999" rtl="0" eaLnBrk="1" latinLnBrk="0" hangingPunct="1">
+        <a:defRPr sz="3051" kern="1200">
           <a:solidFill>
             <a:schemeClr val="tx1"/>
           </a:solidFill>
@@ -2886,8 +2891,8 @@
           <a:cs typeface="+mn-cs"/>
         </a:defRPr>
       </a:lvl3pPr>
-      <a:lvl4pPr marL="1162431" algn="l" defTabSz="774954" rtl="0" eaLnBrk="1" latinLnBrk="0" hangingPunct="1">
-        <a:defRPr sz="1526" kern="1200">
+      <a:lvl4pPr marL="2324999" algn="l" defTabSz="1549999" rtl="0" eaLnBrk="1" latinLnBrk="0" hangingPunct="1">
+        <a:defRPr sz="3051" kern="1200">
           <a:solidFill>
             <a:schemeClr val="tx1"/>
           </a:solidFill>
@@ -2896,8 +2901,8 @@
           <a:cs typeface="+mn-cs"/>
         </a:defRPr>
       </a:lvl4pPr>
-      <a:lvl5pPr marL="1549908" algn="l" defTabSz="774954" rtl="0" eaLnBrk="1" latinLnBrk="0" hangingPunct="1">
-        <a:defRPr sz="1526" kern="1200">
+      <a:lvl5pPr marL="3099999" algn="l" defTabSz="1549999" rtl="0" eaLnBrk="1" latinLnBrk="0" hangingPunct="1">
+        <a:defRPr sz="3051" kern="1200">
           <a:solidFill>
             <a:schemeClr val="tx1"/>
           </a:solidFill>
@@ -2906,8 +2911,8 @@
           <a:cs typeface="+mn-cs"/>
         </a:defRPr>
       </a:lvl5pPr>
-      <a:lvl6pPr marL="1937385" algn="l" defTabSz="774954" rtl="0" eaLnBrk="1" latinLnBrk="0" hangingPunct="1">
-        <a:defRPr sz="1526" kern="1200">
+      <a:lvl6pPr marL="3874999" algn="l" defTabSz="1549999" rtl="0" eaLnBrk="1" latinLnBrk="0" hangingPunct="1">
+        <a:defRPr sz="3051" kern="1200">
           <a:solidFill>
             <a:schemeClr val="tx1"/>
           </a:solidFill>
@@ -2916,8 +2921,8 @@
           <a:cs typeface="+mn-cs"/>
         </a:defRPr>
       </a:lvl6pPr>
-      <a:lvl7pPr marL="2324862" algn="l" defTabSz="774954" rtl="0" eaLnBrk="1" latinLnBrk="0" hangingPunct="1">
-        <a:defRPr sz="1526" kern="1200">
+      <a:lvl7pPr marL="4649998" algn="l" defTabSz="1549999" rtl="0" eaLnBrk="1" latinLnBrk="0" hangingPunct="1">
+        <a:defRPr sz="3051" kern="1200">
           <a:solidFill>
             <a:schemeClr val="tx1"/>
           </a:solidFill>
@@ -2926,8 +2931,8 @@
           <a:cs typeface="+mn-cs"/>
         </a:defRPr>
       </a:lvl7pPr>
-      <a:lvl8pPr marL="2712339" algn="l" defTabSz="774954" rtl="0" eaLnBrk="1" latinLnBrk="0" hangingPunct="1">
-        <a:defRPr sz="1526" kern="1200">
+      <a:lvl8pPr marL="5424998" algn="l" defTabSz="1549999" rtl="0" eaLnBrk="1" latinLnBrk="0" hangingPunct="1">
+        <a:defRPr sz="3051" kern="1200">
           <a:solidFill>
             <a:schemeClr val="tx1"/>
           </a:solidFill>
@@ -2936,8 +2941,8 @@
           <a:cs typeface="+mn-cs"/>
         </a:defRPr>
       </a:lvl8pPr>
-      <a:lvl9pPr marL="3099816" algn="l" defTabSz="774954" rtl="0" eaLnBrk="1" latinLnBrk="0" hangingPunct="1">
-        <a:defRPr sz="1526" kern="1200">
+      <a:lvl9pPr marL="6199998" algn="l" defTabSz="1549999" rtl="0" eaLnBrk="1" latinLnBrk="0" hangingPunct="1">
+        <a:defRPr sz="3051" kern="1200">
           <a:solidFill>
             <a:schemeClr val="tx1"/>
           </a:solidFill>
@@ -2996,8 +3001,8 @@
         </p:blipFill>
         <p:spPr>
           <a:xfrm>
-            <a:off x="651171" y="217981"/>
-            <a:ext cx="4523810" cy="2914286"/>
+            <a:off x="1302341" y="435962"/>
+            <a:ext cx="9047620" cy="5828572"/>
           </a:xfrm>
           <a:prstGeom prst="rect">
             <a:avLst/>
@@ -3032,8 +3037,8 @@
         </p:blipFill>
         <p:spPr>
           <a:xfrm>
-            <a:off x="5237511" y="217981"/>
-            <a:ext cx="4523810" cy="2914286"/>
+            <a:off x="10475023" y="435964"/>
+            <a:ext cx="9047619" cy="5828571"/>
           </a:xfrm>
           <a:prstGeom prst="rect">
             <a:avLst/>
@@ -3068,8 +3073,8 @@
         </p:blipFill>
         <p:spPr>
           <a:xfrm>
-            <a:off x="3067125" y="3268533"/>
-            <a:ext cx="4523810" cy="2914286"/>
+            <a:off x="6134249" y="6537066"/>
+            <a:ext cx="9047620" cy="5828572"/>
           </a:xfrm>
           <a:prstGeom prst="rect">
             <a:avLst/>
@@ -3090,8 +3095,8 @@
         </p:nvSpPr>
         <p:spPr>
           <a:xfrm>
-            <a:off x="2913076" y="3419623"/>
-            <a:ext cx="308098" cy="369332"/>
+            <a:off x="5826151" y="6839247"/>
+            <a:ext cx="676788" cy="1200329"/>
           </a:xfrm>
           <a:prstGeom prst="rect">
             <a:avLst/>
@@ -3105,7 +3110,7 @@
           <a:lstStyle/>
           <a:p>
             <a:r>
-              <a:rPr lang="en-US" dirty="0"/>
+              <a:rPr lang="en-US" sz="7200" dirty="0"/>
               <a:t>C</a:t>
             </a:r>
           </a:p>
@@ -3125,8 +3130,8 @@
         </p:nvSpPr>
         <p:spPr>
           <a:xfrm>
-            <a:off x="5083462" y="442568"/>
-            <a:ext cx="308098" cy="369332"/>
+            <a:off x="10166923" y="885137"/>
+            <a:ext cx="686406" cy="1200329"/>
           </a:xfrm>
           <a:prstGeom prst="rect">
             <a:avLst/>
@@ -3140,7 +3145,7 @@
           <a:lstStyle/>
           <a:p>
             <a:r>
-              <a:rPr lang="en-US" dirty="0"/>
+              <a:rPr lang="en-US" sz="7200" dirty="0"/>
               <a:t>B</a:t>
             </a:r>
           </a:p>
@@ -3160,8 +3165,8 @@
         </p:nvSpPr>
         <p:spPr>
           <a:xfrm>
-            <a:off x="343073" y="441234"/>
-            <a:ext cx="317716" cy="369332"/>
+            <a:off x="686145" y="882469"/>
+            <a:ext cx="718466" cy="1200329"/>
           </a:xfrm>
           <a:prstGeom prst="rect">
             <a:avLst/>
@@ -3175,7 +3180,7 @@
           <a:lstStyle/>
           <a:p>
             <a:r>
-              <a:rPr lang="en-US" dirty="0"/>
+              <a:rPr lang="en-US" sz="7200" dirty="0"/>
               <a:t>A</a:t>
             </a:r>
           </a:p>

</xml_diff>